<commit_message>
the scraping for the first meeting not working because of problems with pip and conda
</commit_message>
<xml_diff>
--- a/2019-09-12/about_the_data.pptx
+++ b/2019-09-12/about_the_data.pptx
@@ -7,6 +7,10 @@
   <p:sldIdLst>
     <p:sldId id="256" r:id="rId2"/>
     <p:sldId id="257" r:id="rId3"/>
+    <p:sldId id="258" r:id="rId4"/>
+    <p:sldId id="259" r:id="rId5"/>
+    <p:sldId id="260" r:id="rId6"/>
+    <p:sldId id="261" r:id="rId7"/>
   </p:sldIdLst>
   <p:sldSz cx="12192000" cy="6858000"/>
   <p:notesSz cx="6858000" cy="9144000"/>
@@ -105,6 +109,11 @@
       </a:defRPr>
     </a:lvl9pPr>
   </p:defaultTextStyle>
+  <p:extLst>
+    <p:ext uri="{EFAFB233-063F-42B5-8137-9DF3F51BA10A}">
+      <p15:sldGuideLst xmlns:p15="http://schemas.microsoft.com/office/powerpoint/2012/main"/>
+    </p:ext>
+  </p:extLst>
 </p:presentation>
 </file>
 
@@ -257,7 +266,7 @@
           <a:p>
             <a:fld id="{50A92491-B8D9-4124-9158-72814E5DC5F0}" type="datetimeFigureOut">
               <a:rPr lang="en-GB" smtClean="0"/>
-              <a:t>31/08/2019</a:t>
+              <a:t>02/09/2019</a:t>
             </a:fld>
             <a:endParaRPr lang="en-GB"/>
           </a:p>
@@ -457,7 +466,7 @@
           <a:p>
             <a:fld id="{50A92491-B8D9-4124-9158-72814E5DC5F0}" type="datetimeFigureOut">
               <a:rPr lang="en-GB" smtClean="0"/>
-              <a:t>31/08/2019</a:t>
+              <a:t>02/09/2019</a:t>
             </a:fld>
             <a:endParaRPr lang="en-GB"/>
           </a:p>
@@ -667,7 +676,7 @@
           <a:p>
             <a:fld id="{50A92491-B8D9-4124-9158-72814E5DC5F0}" type="datetimeFigureOut">
               <a:rPr lang="en-GB" smtClean="0"/>
-              <a:t>31/08/2019</a:t>
+              <a:t>02/09/2019</a:t>
             </a:fld>
             <a:endParaRPr lang="en-GB"/>
           </a:p>
@@ -867,7 +876,7 @@
           <a:p>
             <a:fld id="{50A92491-B8D9-4124-9158-72814E5DC5F0}" type="datetimeFigureOut">
               <a:rPr lang="en-GB" smtClean="0"/>
-              <a:t>31/08/2019</a:t>
+              <a:t>02/09/2019</a:t>
             </a:fld>
             <a:endParaRPr lang="en-GB"/>
           </a:p>
@@ -1143,7 +1152,7 @@
           <a:p>
             <a:fld id="{50A92491-B8D9-4124-9158-72814E5DC5F0}" type="datetimeFigureOut">
               <a:rPr lang="en-GB" smtClean="0"/>
-              <a:t>31/08/2019</a:t>
+              <a:t>02/09/2019</a:t>
             </a:fld>
             <a:endParaRPr lang="en-GB"/>
           </a:p>
@@ -1411,7 +1420,7 @@
           <a:p>
             <a:fld id="{50A92491-B8D9-4124-9158-72814E5DC5F0}" type="datetimeFigureOut">
               <a:rPr lang="en-GB" smtClean="0"/>
-              <a:t>31/08/2019</a:t>
+              <a:t>02/09/2019</a:t>
             </a:fld>
             <a:endParaRPr lang="en-GB"/>
           </a:p>
@@ -1826,7 +1835,7 @@
           <a:p>
             <a:fld id="{50A92491-B8D9-4124-9158-72814E5DC5F0}" type="datetimeFigureOut">
               <a:rPr lang="en-GB" smtClean="0"/>
-              <a:t>31/08/2019</a:t>
+              <a:t>02/09/2019</a:t>
             </a:fld>
             <a:endParaRPr lang="en-GB"/>
           </a:p>
@@ -1968,7 +1977,7 @@
           <a:p>
             <a:fld id="{50A92491-B8D9-4124-9158-72814E5DC5F0}" type="datetimeFigureOut">
               <a:rPr lang="en-GB" smtClean="0"/>
-              <a:t>31/08/2019</a:t>
+              <a:t>02/09/2019</a:t>
             </a:fld>
             <a:endParaRPr lang="en-GB"/>
           </a:p>
@@ -2081,7 +2090,7 @@
           <a:p>
             <a:fld id="{50A92491-B8D9-4124-9158-72814E5DC5F0}" type="datetimeFigureOut">
               <a:rPr lang="en-GB" smtClean="0"/>
-              <a:t>31/08/2019</a:t>
+              <a:t>02/09/2019</a:t>
             </a:fld>
             <a:endParaRPr lang="en-GB"/>
           </a:p>
@@ -2394,7 +2403,7 @@
           <a:p>
             <a:fld id="{50A92491-B8D9-4124-9158-72814E5DC5F0}" type="datetimeFigureOut">
               <a:rPr lang="en-GB" smtClean="0"/>
-              <a:t>31/08/2019</a:t>
+              <a:t>02/09/2019</a:t>
             </a:fld>
             <a:endParaRPr lang="en-GB"/>
           </a:p>
@@ -2683,7 +2692,7 @@
           <a:p>
             <a:fld id="{50A92491-B8D9-4124-9158-72814E5DC5F0}" type="datetimeFigureOut">
               <a:rPr lang="en-GB" smtClean="0"/>
-              <a:t>31/08/2019</a:t>
+              <a:t>02/09/2019</a:t>
             </a:fld>
             <a:endParaRPr lang="en-GB"/>
           </a:p>
@@ -2926,7 +2935,7 @@
           <a:p>
             <a:fld id="{50A92491-B8D9-4124-9158-72814E5DC5F0}" type="datetimeFigureOut">
               <a:rPr lang="en-GB" smtClean="0"/>
-              <a:t>31/08/2019</a:t>
+              <a:t>02/09/2019</a:t>
             </a:fld>
             <a:endParaRPr lang="en-GB"/>
           </a:p>
@@ -3425,31 +3434,6 @@
       </p:grpSpPr>
       <p:sp>
         <p:nvSpPr>
-          <p:cNvPr id="2" name="Title 1">
-            <a:extLst>
-              <a:ext uri="{FF2B5EF4-FFF2-40B4-BE49-F238E27FC236}">
-                <a16:creationId xmlns:a16="http://schemas.microsoft.com/office/drawing/2014/main" id="{1FE3E3AC-D3FA-46A9-AE5F-06D476437828}"/>
-              </a:ext>
-            </a:extLst>
-          </p:cNvPr>
-          <p:cNvSpPr>
-            <a:spLocks noGrp="1"/>
-          </p:cNvSpPr>
-          <p:nvPr>
-            <p:ph type="ctrTitle"/>
-          </p:nvPr>
-        </p:nvSpPr>
-        <p:spPr/>
-        <p:txBody>
-          <a:bodyPr/>
-          <a:lstStyle/>
-          <a:p>
-            <a:endParaRPr lang="en-GB"/>
-          </a:p>
-        </p:txBody>
-      </p:sp>
-      <p:sp>
-        <p:nvSpPr>
           <p:cNvPr id="3" name="Subtitle 2">
             <a:extLst>
               <a:ext uri="{FF2B5EF4-FFF2-40B4-BE49-F238E27FC236}">
@@ -3464,28 +3448,30 @@
             <p:ph type="subTitle" idx="1"/>
           </p:nvPr>
         </p:nvSpPr>
-        <p:spPr/>
+        <p:spPr>
+          <a:xfrm>
+            <a:off x="1318181" y="1113362"/>
+            <a:ext cx="9555637" cy="1026523"/>
+          </a:xfrm>
+        </p:spPr>
         <p:txBody>
           <a:bodyPr/>
           <a:lstStyle/>
           <a:p>
             <a:r>
               <a:rPr lang="en-GB" dirty="0"/>
-              <a:t>Number of sensors in BW: 592</a:t>
-            </a:r>
-          </a:p>
-          <a:p>
-            <a:r>
-              <a:rPr lang="en-GB" dirty="0"/>
-              <a:t>Number of sensors in the </a:t>
-            </a:r>
-            <a:r>
-              <a:rPr lang="en-GB" dirty="0" err="1"/>
-              <a:t>Ostalbkreis</a:t>
-            </a:r>
-            <a:r>
-              <a:rPr lang="en-GB" dirty="0"/>
-              <a:t>: 18</a:t>
+              <a:t>Total number of measurements: </a:t>
+            </a:r>
+            <a:r>
+              <a:rPr lang="en-US" altLang="en-US" dirty="0"/>
+              <a:t>4.7 billion</a:t>
+            </a:r>
+            <a:br>
+              <a:rPr lang="en-US" altLang="en-US" dirty="0"/>
+            </a:br>
+            <a:r>
+              <a:rPr lang="en-US" altLang="en-US" dirty="0"/>
+              <a:t>Measurements per day: 10 million (= 18 000 sensors * 500 measurements)</a:t>
             </a:r>
           </a:p>
         </p:txBody>
@@ -3494,6 +3480,414 @@
     <p:extLst>
       <p:ext uri="{BB962C8B-B14F-4D97-AF65-F5344CB8AC3E}">
         <p14:creationId xmlns:p14="http://schemas.microsoft.com/office/powerpoint/2010/main" val="3652174185"/>
+      </p:ext>
+    </p:extLst>
+  </p:cSld>
+  <p:clrMapOvr>
+    <a:masterClrMapping/>
+  </p:clrMapOvr>
+</p:sld>
+</file>
+
+<file path=ppt/slides/slide3.xml><?xml version="1.0" encoding="utf-8"?>
+<p:sld xmlns:a="http://schemas.openxmlformats.org/drawingml/2006/main" xmlns:r="http://schemas.openxmlformats.org/officeDocument/2006/relationships" xmlns:p="http://schemas.openxmlformats.org/presentationml/2006/main">
+  <p:cSld>
+    <p:spTree>
+      <p:nvGrpSpPr>
+        <p:cNvPr id="1" name=""/>
+        <p:cNvGrpSpPr/>
+        <p:nvPr/>
+      </p:nvGrpSpPr>
+      <p:grpSpPr>
+        <a:xfrm>
+          <a:off x="0" y="0"/>
+          <a:ext cx="0" cy="0"/>
+          <a:chOff x="0" y="0"/>
+          <a:chExt cx="0" cy="0"/>
+        </a:xfrm>
+      </p:grpSpPr>
+      <p:sp>
+        <p:nvSpPr>
+          <p:cNvPr id="3" name="Subtitle 2">
+            <a:extLst>
+              <a:ext uri="{FF2B5EF4-FFF2-40B4-BE49-F238E27FC236}">
+                <a16:creationId xmlns:a16="http://schemas.microsoft.com/office/drawing/2014/main" id="{988480BF-C950-461B-877F-105635E1E447}"/>
+              </a:ext>
+            </a:extLst>
+          </p:cNvPr>
+          <p:cNvSpPr>
+            <a:spLocks noGrp="1"/>
+          </p:cNvSpPr>
+          <p:nvPr>
+            <p:ph type="subTitle" idx="1"/>
+          </p:nvPr>
+        </p:nvSpPr>
+        <p:spPr/>
+        <p:txBody>
+          <a:bodyPr/>
+          <a:lstStyle/>
+          <a:p>
+            <a:r>
+              <a:rPr lang="en-GB" dirty="0"/>
+              <a:t>Number of sensors in BW: 592</a:t>
+            </a:r>
+          </a:p>
+          <a:p>
+            <a:r>
+              <a:rPr lang="en-GB" dirty="0"/>
+              <a:t>Number of sensors in the </a:t>
+            </a:r>
+            <a:r>
+              <a:rPr lang="en-GB" dirty="0" err="1"/>
+              <a:t>Ostalbkreis</a:t>
+            </a:r>
+            <a:r>
+              <a:rPr lang="en-GB" dirty="0"/>
+              <a:t>: 18</a:t>
+            </a:r>
+          </a:p>
+        </p:txBody>
+      </p:sp>
+    </p:spTree>
+    <p:extLst>
+      <p:ext uri="{BB962C8B-B14F-4D97-AF65-F5344CB8AC3E}">
+        <p14:creationId xmlns:p14="http://schemas.microsoft.com/office/powerpoint/2010/main" val="2770114560"/>
+      </p:ext>
+    </p:extLst>
+  </p:cSld>
+  <p:clrMapOvr>
+    <a:masterClrMapping/>
+  </p:clrMapOvr>
+</p:sld>
+</file>
+
+<file path=ppt/slides/slide4.xml><?xml version="1.0" encoding="utf-8"?>
+<p:sld xmlns:a="http://schemas.openxmlformats.org/drawingml/2006/main" xmlns:r="http://schemas.openxmlformats.org/officeDocument/2006/relationships" xmlns:p="http://schemas.openxmlformats.org/presentationml/2006/main">
+  <p:cSld>
+    <p:spTree>
+      <p:nvGrpSpPr>
+        <p:cNvPr id="1" name=""/>
+        <p:cNvGrpSpPr/>
+        <p:nvPr/>
+      </p:nvGrpSpPr>
+      <p:grpSpPr>
+        <a:xfrm>
+          <a:off x="0" y="0"/>
+          <a:ext cx="0" cy="0"/>
+          <a:chOff x="0" y="0"/>
+          <a:chExt cx="0" cy="0"/>
+        </a:xfrm>
+      </p:grpSpPr>
+      <p:sp>
+        <p:nvSpPr>
+          <p:cNvPr id="3" name="Subtitle 2">
+            <a:extLst>
+              <a:ext uri="{FF2B5EF4-FFF2-40B4-BE49-F238E27FC236}">
+                <a16:creationId xmlns:a16="http://schemas.microsoft.com/office/drawing/2014/main" id="{988480BF-C950-461B-877F-105635E1E447}"/>
+              </a:ext>
+            </a:extLst>
+          </p:cNvPr>
+          <p:cNvSpPr>
+            <a:spLocks noGrp="1"/>
+          </p:cNvSpPr>
+          <p:nvPr>
+            <p:ph type="subTitle" idx="1"/>
+          </p:nvPr>
+        </p:nvSpPr>
+        <p:spPr/>
+        <p:txBody>
+          <a:bodyPr/>
+          <a:lstStyle/>
+          <a:p>
+            <a:r>
+              <a:rPr lang="en-GB" dirty="0"/>
+              <a:t>BMP180: </a:t>
+            </a:r>
+            <a:r>
+              <a:rPr lang="en-GB" dirty="0" err="1"/>
+              <a:t>value_types</a:t>
+            </a:r>
+            <a:r>
+              <a:rPr lang="en-GB" dirty="0"/>
+              <a:t>: temperature, pressure; X-Pin: 3</a:t>
+            </a:r>
+            <a:br>
+              <a:rPr lang="en-GB" dirty="0"/>
+            </a:br>
+            <a:r>
+              <a:rPr lang="en-GB" dirty="0"/>
+              <a:t>BME280: </a:t>
+            </a:r>
+            <a:r>
+              <a:rPr lang="en-GB" dirty="0" err="1"/>
+              <a:t>value_types</a:t>
+            </a:r>
+            <a:r>
+              <a:rPr lang="en-GB" dirty="0"/>
+              <a:t>: temperature, humidity, pressure; X-Pin: 11</a:t>
+            </a:r>
+            <a:br>
+              <a:rPr lang="en-GB" dirty="0"/>
+            </a:br>
+            <a:r>
+              <a:rPr lang="en-GB" dirty="0"/>
+              <a:t>PMS1003 - PMS 7003: </a:t>
+            </a:r>
+            <a:r>
+              <a:rPr lang="en-GB" dirty="0" err="1"/>
+              <a:t>value_types</a:t>
+            </a:r>
+            <a:r>
+              <a:rPr lang="en-GB" dirty="0"/>
+              <a:t>: </a:t>
+            </a:r>
+            <a:r>
+              <a:rPr lang="en-GB" b="1" dirty="0"/>
+              <a:t>P1 (PM10), P2 (PM2.5); </a:t>
+            </a:r>
+            <a:r>
+              <a:rPr lang="en-GB" dirty="0"/>
+              <a:t>X-Pin: 1</a:t>
+            </a:r>
+          </a:p>
+        </p:txBody>
+      </p:sp>
+    </p:spTree>
+    <p:extLst>
+      <p:ext uri="{BB962C8B-B14F-4D97-AF65-F5344CB8AC3E}">
+        <p14:creationId xmlns:p14="http://schemas.microsoft.com/office/powerpoint/2010/main" val="98133360"/>
+      </p:ext>
+    </p:extLst>
+  </p:cSld>
+  <p:clrMapOvr>
+    <a:masterClrMapping/>
+  </p:clrMapOvr>
+</p:sld>
+</file>
+
+<file path=ppt/slides/slide5.xml><?xml version="1.0" encoding="utf-8"?>
+<p:sld xmlns:a="http://schemas.openxmlformats.org/drawingml/2006/main" xmlns:r="http://schemas.openxmlformats.org/officeDocument/2006/relationships" xmlns:p="http://schemas.openxmlformats.org/presentationml/2006/main">
+  <p:cSld>
+    <p:spTree>
+      <p:nvGrpSpPr>
+        <p:cNvPr id="1" name=""/>
+        <p:cNvGrpSpPr/>
+        <p:nvPr/>
+      </p:nvGrpSpPr>
+      <p:grpSpPr>
+        <a:xfrm>
+          <a:off x="0" y="0"/>
+          <a:ext cx="0" cy="0"/>
+          <a:chOff x="0" y="0"/>
+          <a:chExt cx="0" cy="0"/>
+        </a:xfrm>
+      </p:grpSpPr>
+      <p:sp>
+        <p:nvSpPr>
+          <p:cNvPr id="4" name="Subtitle 3">
+            <a:extLst>
+              <a:ext uri="{FF2B5EF4-FFF2-40B4-BE49-F238E27FC236}">
+                <a16:creationId xmlns:a16="http://schemas.microsoft.com/office/drawing/2014/main" id="{DF38FD3D-66BC-450E-8BEE-31AFFCE9458D}"/>
+              </a:ext>
+            </a:extLst>
+          </p:cNvPr>
+          <p:cNvSpPr>
+            <a:spLocks noGrp="1"/>
+          </p:cNvSpPr>
+          <p:nvPr>
+            <p:ph type="subTitle" idx="1"/>
+          </p:nvPr>
+        </p:nvSpPr>
+        <p:spPr/>
+        <p:txBody>
+          <a:bodyPr/>
+          <a:lstStyle/>
+          <a:p>
+            <a:pPr algn="l"/>
+            <a:r>
+              <a:rPr lang="en-GB" dirty="0"/>
+              <a:t>Useful Links:  </a:t>
+            </a:r>
+          </a:p>
+          <a:p>
+            <a:pPr marL="342900" indent="-342900" algn="l">
+              <a:buFont typeface="Arial" panose="020B0604020202020204" pitchFamily="34" charset="0"/>
+              <a:buChar char="•"/>
+            </a:pPr>
+            <a:r>
+              <a:rPr lang="en-GB" dirty="0">
+                <a:hlinkClick r:id="rId2"/>
+              </a:rPr>
+              <a:t>https://de.wikipedia.org/wiki/Feinstaub</a:t>
+            </a:r>
+            <a:endParaRPr lang="en-GB" dirty="0"/>
+          </a:p>
+          <a:p>
+            <a:pPr marL="342900" indent="-342900" algn="l">
+              <a:buFont typeface="Arial" panose="020B0604020202020204" pitchFamily="34" charset="0"/>
+              <a:buChar char="•"/>
+            </a:pPr>
+            <a:r>
+              <a:rPr lang="en-GB" dirty="0"/>
+              <a:t>https://blog.helmutkarger.de/feinstaubsensor-teil-11-datenabruf/</a:t>
+            </a:r>
+          </a:p>
+        </p:txBody>
+      </p:sp>
+    </p:spTree>
+    <p:extLst>
+      <p:ext uri="{BB962C8B-B14F-4D97-AF65-F5344CB8AC3E}">
+        <p14:creationId xmlns:p14="http://schemas.microsoft.com/office/powerpoint/2010/main" val="463032934"/>
+      </p:ext>
+    </p:extLst>
+  </p:cSld>
+  <p:clrMapOvr>
+    <a:masterClrMapping/>
+  </p:clrMapOvr>
+</p:sld>
+</file>
+
+<file path=ppt/slides/slide6.xml><?xml version="1.0" encoding="utf-8"?>
+<p:sld xmlns:a="http://schemas.openxmlformats.org/drawingml/2006/main" xmlns:r="http://schemas.openxmlformats.org/officeDocument/2006/relationships" xmlns:p="http://schemas.openxmlformats.org/presentationml/2006/main">
+  <p:cSld>
+    <p:spTree>
+      <p:nvGrpSpPr>
+        <p:cNvPr id="1" name=""/>
+        <p:cNvGrpSpPr/>
+        <p:nvPr/>
+      </p:nvGrpSpPr>
+      <p:grpSpPr>
+        <a:xfrm>
+          <a:off x="0" y="0"/>
+          <a:ext cx="0" cy="0"/>
+          <a:chOff x="0" y="0"/>
+          <a:chExt cx="0" cy="0"/>
+        </a:xfrm>
+      </p:grpSpPr>
+      <p:sp>
+        <p:nvSpPr>
+          <p:cNvPr id="4" name="Subtitle 3">
+            <a:extLst>
+              <a:ext uri="{FF2B5EF4-FFF2-40B4-BE49-F238E27FC236}">
+                <a16:creationId xmlns:a16="http://schemas.microsoft.com/office/drawing/2014/main" id="{DF38FD3D-66BC-450E-8BEE-31AFFCE9458D}"/>
+              </a:ext>
+            </a:extLst>
+          </p:cNvPr>
+          <p:cNvSpPr>
+            <a:spLocks noGrp="1"/>
+          </p:cNvSpPr>
+          <p:nvPr>
+            <p:ph type="subTitle" idx="1"/>
+          </p:nvPr>
+        </p:nvSpPr>
+        <p:spPr>
+          <a:xfrm>
+            <a:off x="1307184" y="755143"/>
+            <a:ext cx="9144000" cy="1655762"/>
+          </a:xfrm>
+        </p:spPr>
+        <p:txBody>
+          <a:bodyPr>
+            <a:normAutofit lnSpcReduction="10000"/>
+          </a:bodyPr>
+          <a:lstStyle/>
+          <a:p>
+            <a:pPr algn="l"/>
+            <a:r>
+              <a:rPr lang="en-GB" dirty="0" err="1"/>
+              <a:t>Richtlinie</a:t>
+            </a:r>
+            <a:r>
+              <a:rPr lang="en-GB" dirty="0"/>
+              <a:t> 2008/50/EG:  </a:t>
+            </a:r>
+          </a:p>
+          <a:p>
+            <a:pPr marL="342900" indent="-342900" algn="l">
+              <a:buFont typeface="Arial" panose="020B0604020202020204" pitchFamily="34" charset="0"/>
+              <a:buChar char="•"/>
+            </a:pPr>
+            <a:r>
+              <a:rPr lang="de-DE" dirty="0"/>
+              <a:t>Tagesmittelwert für PM</a:t>
+            </a:r>
+            <a:r>
+              <a:rPr lang="de-DE" baseline="-25000" dirty="0"/>
+              <a:t>10</a:t>
+            </a:r>
+            <a:r>
+              <a:rPr lang="de-DE" dirty="0"/>
+              <a:t> darf höchstens 50 µg/m³ betragen </a:t>
+            </a:r>
+            <a:br>
+              <a:rPr lang="de-DE" dirty="0"/>
+            </a:br>
+            <a:r>
+              <a:rPr lang="de-DE" dirty="0"/>
+              <a:t>(7 Überschreitungen pro Jahr sind erlaubt)</a:t>
+            </a:r>
+          </a:p>
+          <a:p>
+            <a:pPr marL="342900" indent="-342900" algn="l">
+              <a:buFont typeface="Arial" panose="020B0604020202020204" pitchFamily="34" charset="0"/>
+              <a:buChar char="•"/>
+            </a:pPr>
+            <a:r>
+              <a:rPr lang="de-DE" dirty="0"/>
+              <a:t>Der Jahresmittelwert darf PM</a:t>
+            </a:r>
+            <a:r>
+              <a:rPr lang="de-DE" baseline="-25000" dirty="0"/>
+              <a:t>10</a:t>
+            </a:r>
+            <a:r>
+              <a:rPr lang="de-DE" dirty="0"/>
+              <a:t> 40 µg/m³ nicht überschreiten</a:t>
+            </a:r>
+            <a:endParaRPr lang="en-GB" dirty="0"/>
+          </a:p>
+        </p:txBody>
+      </p:sp>
+      <p:pic>
+        <p:nvPicPr>
+          <p:cNvPr id="3" name="Picture 2" descr="A screenshot of a social media post&#10;&#10;Description automatically generated">
+            <a:extLst>
+              <a:ext uri="{FF2B5EF4-FFF2-40B4-BE49-F238E27FC236}">
+                <a16:creationId xmlns:a16="http://schemas.microsoft.com/office/drawing/2014/main" id="{47FEFFE2-4581-477C-AC1E-6106D5074520}"/>
+              </a:ext>
+            </a:extLst>
+          </p:cNvPr>
+          <p:cNvPicPr>
+            <a:picLocks noChangeAspect="1"/>
+          </p:cNvPicPr>
+          <p:nvPr/>
+        </p:nvPicPr>
+        <p:blipFill>
+          <a:blip r:embed="rId2">
+            <a:extLst>
+              <a:ext uri="{28A0092B-C50C-407E-A947-70E740481C1C}">
+                <a14:useLocalDpi xmlns:a14="http://schemas.microsoft.com/office/drawing/2010/main" val="0"/>
+              </a:ext>
+            </a:extLst>
+          </a:blip>
+          <a:stretch>
+            <a:fillRect/>
+          </a:stretch>
+        </p:blipFill>
+        <p:spPr>
+          <a:xfrm>
+            <a:off x="1307184" y="2558751"/>
+            <a:ext cx="8570761" cy="4299249"/>
+          </a:xfrm>
+          <a:prstGeom prst="rect">
+            <a:avLst/>
+          </a:prstGeom>
+        </p:spPr>
+      </p:pic>
+    </p:spTree>
+    <p:extLst>
+      <p:ext uri="{BB962C8B-B14F-4D97-AF65-F5344CB8AC3E}">
+        <p14:creationId xmlns:p14="http://schemas.microsoft.com/office/powerpoint/2010/main" val="545624947"/>
       </p:ext>
     </p:extLst>
   </p:cSld>

</xml_diff>